<commit_message>
add small encoding fix
</commit_message>
<xml_diff>
--- a/lessons/Day5_supervised_unsupervised/B_ElasticNet_textRegression.pptx
+++ b/lessons/Day5_supervised_unsupervised/B_ElasticNet_textRegression.pptx
@@ -21,14 +21,14 @@
     <p:sldId id="824" r:id="rId12"/>
     <p:sldId id="829" r:id="rId13"/>
     <p:sldId id="851" r:id="rId14"/>
-    <p:sldId id="819" r:id="rId15"/>
-    <p:sldId id="823" r:id="rId16"/>
-    <p:sldId id="844" r:id="rId17"/>
-    <p:sldId id="845" r:id="rId18"/>
-    <p:sldId id="846" r:id="rId19"/>
-    <p:sldId id="847" r:id="rId20"/>
-    <p:sldId id="848" r:id="rId21"/>
-    <p:sldId id="849" r:id="rId22"/>
+    <p:sldId id="823" r:id="rId15"/>
+    <p:sldId id="844" r:id="rId16"/>
+    <p:sldId id="845" r:id="rId17"/>
+    <p:sldId id="846" r:id="rId18"/>
+    <p:sldId id="847" r:id="rId19"/>
+    <p:sldId id="848" r:id="rId20"/>
+    <p:sldId id="849" r:id="rId21"/>
+    <p:sldId id="819" r:id="rId22"/>
     <p:sldId id="825" r:id="rId23"/>
     <p:sldId id="826" r:id="rId24"/>
     <p:sldId id="850" r:id="rId25"/>
@@ -5858,7 +5858,7 @@
           <a:p>
             <a:fld id="{B0C0A60C-850A-4EA4-9C14-A8FE98B94505}" type="datetimeFigureOut">
               <a:rPr lang="en-US" smtClean="0"/>
-              <a:t>6/9/24</a:t>
+              <a:t>6/14/24</a:t>
             </a:fld>
             <a:endParaRPr lang="en-US"/>
           </a:p>
@@ -6306,7 +6306,7 @@
           <a:p>
             <a:fld id="{24E9AA13-E3FC-4BB6-B68D-5F0F5803D716}" type="slidenum">
               <a:rPr lang="en-US" smtClean="0"/>
-              <a:t>15</a:t>
+              <a:t>14</a:t>
             </a:fld>
             <a:endParaRPr lang="en-US"/>
           </a:p>
@@ -6457,7 +6457,7 @@
           <a:p>
             <a:fld id="{5738B90E-0779-4C36-915C-6F05FCD89456}" type="datetime1">
               <a:rPr lang="en-US" smtClean="0"/>
-              <a:t>6/9/24</a:t>
+              <a:t>6/14/24</a:t>
             </a:fld>
             <a:endParaRPr lang="en-US"/>
           </a:p>
@@ -6654,7 +6654,7 @@
           <a:p>
             <a:fld id="{7B9EA29D-D431-42FE-B7B6-AAE4454C77D3}" type="datetime1">
               <a:rPr lang="en-US" smtClean="0"/>
-              <a:t>6/9/24</a:t>
+              <a:t>6/14/24</a:t>
             </a:fld>
             <a:endParaRPr lang="en-US"/>
           </a:p>
@@ -7009,7 +7009,7 @@
           <a:p>
             <a:fld id="{690D8A1E-EA8F-46C1-B891-AE0C00D9C314}" type="datetime1">
               <a:rPr lang="en-US" smtClean="0"/>
-              <a:t>6/9/24</a:t>
+              <a:t>6/14/24</a:t>
             </a:fld>
             <a:endParaRPr lang="en-US"/>
           </a:p>
@@ -7317,7 +7317,7 @@
           <a:p>
             <a:fld id="{D753EFC8-4232-4598-94F6-94C0EBAFC469}" type="datetime1">
               <a:rPr lang="en-US" smtClean="0"/>
-              <a:t>6/9/24</a:t>
+              <a:t>6/14/24</a:t>
             </a:fld>
             <a:endParaRPr lang="en-US"/>
           </a:p>
@@ -7646,7 +7646,7 @@
           <a:p>
             <a:fld id="{F3161074-1C18-4AE7-957D-F18524378C85}" type="datetime1">
               <a:rPr lang="en-US" smtClean="0"/>
-              <a:t>6/9/24</a:t>
+              <a:t>6/14/24</a:t>
             </a:fld>
             <a:endParaRPr lang="en-US"/>
           </a:p>
@@ -7899,7 +7899,7 @@
           <a:p>
             <a:fld id="{69BE256C-8D9A-4404-B47D-41A1AE514425}" type="datetime1">
               <a:rPr lang="en-US" smtClean="0"/>
-              <a:t>6/9/24</a:t>
+              <a:t>6/14/24</a:t>
             </a:fld>
             <a:endParaRPr lang="en-US"/>
           </a:p>
@@ -8347,7 +8347,7 @@
           <a:p>
             <a:fld id="{66CB2154-9035-4012-8189-BAAB61C5A5EE}" type="datetime1">
               <a:rPr lang="en-US" smtClean="0"/>
-              <a:t>6/9/24</a:t>
+              <a:t>6/14/24</a:t>
             </a:fld>
             <a:endParaRPr lang="en-US"/>
           </a:p>
@@ -8535,7 +8535,7 @@
           <a:p>
             <a:fld id="{6700A58B-DD98-43D0-B791-721480A02982}" type="datetime1">
               <a:rPr lang="en-US" smtClean="0"/>
-              <a:t>6/9/24</a:t>
+              <a:t>6/14/24</a:t>
             </a:fld>
             <a:endParaRPr lang="en-US"/>
           </a:p>
@@ -8741,7 +8741,7 @@
           <a:p>
             <a:fld id="{7DB6E382-4F61-4E24-BE1A-377EC83D0E3A}" type="datetime1">
               <a:rPr lang="en-US" smtClean="0"/>
-              <a:t>6/9/24</a:t>
+              <a:t>6/14/24</a:t>
             </a:fld>
             <a:endParaRPr lang="en-US"/>
           </a:p>
@@ -9147,7 +9147,7 @@
           <a:p>
             <a:fld id="{4142EED6-FC16-45B9-B8C4-2BC5DBA88325}" type="datetime1">
               <a:rPr lang="en-US" smtClean="0"/>
-              <a:t>6/9/24</a:t>
+              <a:t>6/14/24</a:t>
             </a:fld>
             <a:endParaRPr lang="en-US"/>
           </a:p>
@@ -9479,7 +9479,7 @@
           <a:p>
             <a:fld id="{DF59512B-4F1D-43D7-8819-2F53FEF69650}" type="datetime1">
               <a:rPr lang="en-US" smtClean="0"/>
-              <a:t>6/9/24</a:t>
+              <a:t>6/14/24</a:t>
             </a:fld>
             <a:endParaRPr lang="en-US"/>
           </a:p>
@@ -9769,7 +9769,7 @@
           <a:p>
             <a:fld id="{08437B94-E2BF-44DC-ADC5-B05FC9934E9D}" type="datetime1">
               <a:rPr lang="en-US" smtClean="0"/>
-              <a:t>6/9/24</a:t>
+              <a:t>6/14/24</a:t>
             </a:fld>
             <a:endParaRPr lang="en-US"/>
           </a:p>
@@ -10208,7 +10208,7 @@
           <a:p>
             <a:fld id="{6700A58B-DD98-43D0-B791-721480A02982}" type="datetime1">
               <a:rPr lang="en-US" smtClean="0"/>
-              <a:t>6/9/24</a:t>
+              <a:t>6/14/24</a:t>
             </a:fld>
             <a:endParaRPr lang="en-US"/>
           </a:p>
@@ -10523,7 +10523,7 @@
           <a:p>
             <a:fld id="{6700A58B-DD98-43D0-B791-721480A02982}" type="datetime1">
               <a:rPr lang="en-US" smtClean="0"/>
-              <a:t>6/9/24</a:t>
+              <a:t>6/14/24</a:t>
             </a:fld>
             <a:endParaRPr lang="en-US"/>
           </a:p>
@@ -11710,7 +11710,7 @@
           <a:p>
             <a:fld id="{6700A58B-DD98-43D0-B791-721480A02982}" type="datetime1">
               <a:rPr lang="en-US" smtClean="0"/>
-              <a:t>6/9/24</a:t>
+              <a:t>6/14/24</a:t>
             </a:fld>
             <a:endParaRPr lang="en-US"/>
           </a:p>
@@ -12184,7 +12184,7 @@
           <a:p>
             <a:fld id="{6700A58B-DD98-43D0-B791-721480A02982}" type="datetime1">
               <a:rPr lang="en-US" smtClean="0"/>
-              <a:t>6/9/24</a:t>
+              <a:t>6/14/24</a:t>
             </a:fld>
             <a:endParaRPr lang="en-US"/>
           </a:p>
@@ -13859,7 +13859,7 @@
           <a:p>
             <a:fld id="{6700A58B-DD98-43D0-B791-721480A02982}" type="datetime1">
               <a:rPr lang="en-US" smtClean="0"/>
-              <a:t>6/9/24</a:t>
+              <a:t>6/14/24</a:t>
             </a:fld>
             <a:endParaRPr lang="en-US"/>
           </a:p>
@@ -14776,286 +14776,6 @@
           <p:cNvPr id="2" name="Date Placeholder 1">
             <a:extLst>
               <a:ext uri="{FF2B5EF4-FFF2-40B4-BE49-F238E27FC236}">
-                <a16:creationId xmlns:a16="http://schemas.microsoft.com/office/drawing/2014/main" id="{ECC9EAEF-AC39-4F46-A876-835A218CE916}"/>
-              </a:ext>
-            </a:extLst>
-          </p:cNvPr>
-          <p:cNvSpPr>
-            <a:spLocks noGrp="1"/>
-          </p:cNvSpPr>
-          <p:nvPr>
-            <p:ph type="dt" sz="half" idx="10"/>
-          </p:nvPr>
-        </p:nvSpPr>
-        <p:spPr/>
-        <p:txBody>
-          <a:bodyPr/>
-          <a:lstStyle/>
-          <a:p>
-            <a:fld id="{6700A58B-DD98-43D0-B791-721480A02982}" type="datetime1">
-              <a:rPr lang="en-US" smtClean="0"/>
-              <a:t>6/9/24</a:t>
-            </a:fld>
-            <a:endParaRPr lang="en-US"/>
-          </a:p>
-        </p:txBody>
-      </p:sp>
-      <p:sp>
-        <p:nvSpPr>
-          <p:cNvPr id="3" name="Title 2">
-            <a:extLst>
-              <a:ext uri="{FF2B5EF4-FFF2-40B4-BE49-F238E27FC236}">
-                <a16:creationId xmlns:a16="http://schemas.microsoft.com/office/drawing/2014/main" id="{C68D9455-329F-447E-98A3-DD3FB11137D9}"/>
-              </a:ext>
-            </a:extLst>
-          </p:cNvPr>
-          <p:cNvSpPr>
-            <a:spLocks noGrp="1"/>
-          </p:cNvSpPr>
-          <p:nvPr>
-            <p:ph type="title"/>
-          </p:nvPr>
-        </p:nvSpPr>
-        <p:spPr/>
-        <p:txBody>
-          <a:bodyPr/>
-          <a:lstStyle/>
-          <a:p>
-            <a:r>
-              <a:rPr lang="en-US" dirty="0" err="1"/>
-              <a:t>D_ElasticNetExample.R</a:t>
-            </a:r>
-            <a:endParaRPr lang="en-US" dirty="0"/>
-          </a:p>
-        </p:txBody>
-      </p:sp>
-      <p:sp>
-        <p:nvSpPr>
-          <p:cNvPr id="4" name="Footer Placeholder 3">
-            <a:extLst>
-              <a:ext uri="{FF2B5EF4-FFF2-40B4-BE49-F238E27FC236}">
-                <a16:creationId xmlns:a16="http://schemas.microsoft.com/office/drawing/2014/main" id="{AAF96DF4-DEB8-4A32-97BF-72315D909EE9}"/>
-              </a:ext>
-            </a:extLst>
-          </p:cNvPr>
-          <p:cNvSpPr>
-            <a:spLocks noGrp="1"/>
-          </p:cNvSpPr>
-          <p:nvPr>
-            <p:ph type="ftr" sz="quarter" idx="3"/>
-          </p:nvPr>
-        </p:nvSpPr>
-        <p:spPr/>
-        <p:txBody>
-          <a:bodyPr/>
-          <a:lstStyle/>
-          <a:p>
-            <a:r>
-              <a:rPr lang="en-US"/>
-              <a:t>Kwartler</a:t>
-            </a:r>
-            <a:endParaRPr lang="en-US" dirty="0"/>
-          </a:p>
-        </p:txBody>
-      </p:sp>
-      <p:sp>
-        <p:nvSpPr>
-          <p:cNvPr id="5" name="Slide Number Placeholder 4">
-            <a:extLst>
-              <a:ext uri="{FF2B5EF4-FFF2-40B4-BE49-F238E27FC236}">
-                <a16:creationId xmlns:a16="http://schemas.microsoft.com/office/drawing/2014/main" id="{296BF0B2-5E54-4380-8ECC-7D4A0500B1D2}"/>
-              </a:ext>
-            </a:extLst>
-          </p:cNvPr>
-          <p:cNvSpPr>
-            <a:spLocks noGrp="1"/>
-          </p:cNvSpPr>
-          <p:nvPr>
-            <p:ph type="sldNum" sz="quarter" idx="4"/>
-          </p:nvPr>
-        </p:nvSpPr>
-        <p:spPr/>
-        <p:txBody>
-          <a:bodyPr/>
-          <a:lstStyle/>
-          <a:p>
-            <a:fld id="{37290FF7-652B-4475-AEAB-8B1A5D23AE09}" type="slidenum">
-              <a:rPr lang="en-US" smtClean="0"/>
-              <a:pPr/>
-              <a:t>14</a:t>
-            </a:fld>
-            <a:endParaRPr lang="en-US" dirty="0"/>
-          </a:p>
-        </p:txBody>
-      </p:sp>
-      <p:pic>
-        <p:nvPicPr>
-          <p:cNvPr id="5122" name="Picture 2" descr="Image result for hospital  meme">
-            <a:extLst>
-              <a:ext uri="{FF2B5EF4-FFF2-40B4-BE49-F238E27FC236}">
-                <a16:creationId xmlns:a16="http://schemas.microsoft.com/office/drawing/2014/main" id="{51CC7F37-F786-4DE2-91E8-A86E347DECCD}"/>
-              </a:ext>
-            </a:extLst>
-          </p:cNvPr>
-          <p:cNvPicPr>
-            <a:picLocks noChangeAspect="1" noChangeArrowheads="1"/>
-          </p:cNvPicPr>
-          <p:nvPr/>
-        </p:nvPicPr>
-        <p:blipFill>
-          <a:blip r:embed="rId2">
-            <a:extLst>
-              <a:ext uri="{28A0092B-C50C-407E-A947-70E740481C1C}">
-                <a14:useLocalDpi xmlns:a14="http://schemas.microsoft.com/office/drawing/2010/main" val="0"/>
-              </a:ext>
-            </a:extLst>
-          </a:blip>
-          <a:srcRect/>
-          <a:stretch>
-            <a:fillRect/>
-          </a:stretch>
-        </p:blipFill>
-        <p:spPr bwMode="auto">
-          <a:xfrm>
-            <a:off x="2933915" y="1815818"/>
-            <a:ext cx="3276171" cy="3226364"/>
-          </a:xfrm>
-          <a:prstGeom prst="rect">
-            <a:avLst/>
-          </a:prstGeom>
-          <a:noFill/>
-          <a:extLst>
-            <a:ext uri="{909E8E84-426E-40DD-AFC4-6F175D3DCCD1}">
-              <a14:hiddenFill xmlns:a14="http://schemas.microsoft.com/office/drawing/2010/main">
-                <a:solidFill>
-                  <a:srgbClr val="FFFFFF"/>
-                </a:solidFill>
-              </a14:hiddenFill>
-            </a:ext>
-          </a:extLst>
-        </p:spPr>
-      </p:pic>
-      <p:cxnSp>
-        <p:nvCxnSpPr>
-          <p:cNvPr id="7" name="Straight Connector 6">
-            <a:extLst>
-              <a:ext uri="{FF2B5EF4-FFF2-40B4-BE49-F238E27FC236}">
-                <a16:creationId xmlns:a16="http://schemas.microsoft.com/office/drawing/2014/main" id="{3CAAFB49-6457-3542-A9A6-A0274DD4E24B}"/>
-              </a:ext>
-            </a:extLst>
-          </p:cNvPr>
-          <p:cNvCxnSpPr/>
-          <p:nvPr/>
-        </p:nvCxnSpPr>
-        <p:spPr>
-          <a:xfrm>
-            <a:off x="6798363" y="6549885"/>
-            <a:ext cx="0" cy="182880"/>
-          </a:xfrm>
-          <a:prstGeom prst="line">
-            <a:avLst/>
-          </a:prstGeom>
-          <a:ln>
-            <a:solidFill>
-              <a:schemeClr val="bg1">
-                <a:lumMod val="85000"/>
-              </a:schemeClr>
-            </a:solidFill>
-          </a:ln>
-        </p:spPr>
-        <p:style>
-          <a:lnRef idx="1">
-            <a:schemeClr val="accent1"/>
-          </a:lnRef>
-          <a:fillRef idx="0">
-            <a:schemeClr val="accent1"/>
-          </a:fillRef>
-          <a:effectRef idx="0">
-            <a:schemeClr val="accent1"/>
-          </a:effectRef>
-          <a:fontRef idx="minor">
-            <a:schemeClr val="tx1"/>
-          </a:fontRef>
-        </p:style>
-      </p:cxnSp>
-      <p:cxnSp>
-        <p:nvCxnSpPr>
-          <p:cNvPr id="8" name="Straight Connector 7">
-            <a:extLst>
-              <a:ext uri="{FF2B5EF4-FFF2-40B4-BE49-F238E27FC236}">
-                <a16:creationId xmlns:a16="http://schemas.microsoft.com/office/drawing/2014/main" id="{E861C8D8-E5BF-B147-9DC8-726AE0008BC3}"/>
-              </a:ext>
-            </a:extLst>
-          </p:cNvPr>
-          <p:cNvCxnSpPr/>
-          <p:nvPr/>
-        </p:nvCxnSpPr>
-        <p:spPr>
-          <a:xfrm>
-            <a:off x="7076661" y="4664763"/>
-            <a:ext cx="182880" cy="0"/>
-          </a:xfrm>
-          <a:prstGeom prst="line">
-            <a:avLst/>
-          </a:prstGeom>
-          <a:ln>
-            <a:solidFill>
-              <a:schemeClr val="bg1">
-                <a:lumMod val="85000"/>
-              </a:schemeClr>
-            </a:solidFill>
-          </a:ln>
-        </p:spPr>
-        <p:style>
-          <a:lnRef idx="1">
-            <a:schemeClr val="accent1"/>
-          </a:lnRef>
-          <a:fillRef idx="0">
-            <a:schemeClr val="accent1"/>
-          </a:fillRef>
-          <a:effectRef idx="0">
-            <a:schemeClr val="accent1"/>
-          </a:effectRef>
-          <a:fontRef idx="minor">
-            <a:schemeClr val="tx1"/>
-          </a:fontRef>
-        </p:style>
-      </p:cxnSp>
-    </p:spTree>
-    <p:extLst>
-      <p:ext uri="{BB962C8B-B14F-4D97-AF65-F5344CB8AC3E}">
-        <p14:creationId xmlns:p14="http://schemas.microsoft.com/office/powerpoint/2010/main" val="568174202"/>
-      </p:ext>
-    </p:extLst>
-  </p:cSld>
-  <p:clrMapOvr>
-    <a:masterClrMapping/>
-  </p:clrMapOvr>
-</p:sld>
-</file>
-
-<file path=ppt/slides/slide15.xml><?xml version="1.0" encoding="utf-8"?>
-<p:sld xmlns:a="http://schemas.openxmlformats.org/drawingml/2006/main" xmlns:r="http://schemas.openxmlformats.org/officeDocument/2006/relationships" xmlns:p="http://schemas.openxmlformats.org/presentationml/2006/main">
-  <p:cSld>
-    <p:spTree>
-      <p:nvGrpSpPr>
-        <p:cNvPr id="1" name=""/>
-        <p:cNvGrpSpPr/>
-        <p:nvPr/>
-      </p:nvGrpSpPr>
-      <p:grpSpPr>
-        <a:xfrm>
-          <a:off x="0" y="0"/>
-          <a:ext cx="0" cy="0"/>
-          <a:chOff x="0" y="0"/>
-          <a:chExt cx="0" cy="0"/>
-        </a:xfrm>
-      </p:grpSpPr>
-      <p:sp>
-        <p:nvSpPr>
-          <p:cNvPr id="2" name="Date Placeholder 1">
-            <a:extLst>
-              <a:ext uri="{FF2B5EF4-FFF2-40B4-BE49-F238E27FC236}">
                 <a16:creationId xmlns:a16="http://schemas.microsoft.com/office/drawing/2014/main" id="{74BA9DE6-3EE3-4485-A9AB-D058E33ED4F0}"/>
               </a:ext>
             </a:extLst>
@@ -15074,7 +14794,7 @@
           <a:p>
             <a:fld id="{6700A58B-DD98-43D0-B791-721480A02982}" type="datetime1">
               <a:rPr lang="en-US" smtClean="0"/>
-              <a:t>6/9/24</a:t>
+              <a:t>6/14/24</a:t>
             </a:fld>
             <a:endParaRPr lang="en-US"/>
           </a:p>
@@ -15161,7 +14881,7 @@
             <a:fld id="{37290FF7-652B-4475-AEAB-8B1A5D23AE09}" type="slidenum">
               <a:rPr lang="en-US" smtClean="0"/>
               <a:pPr/>
-              <a:t>15</a:t>
+              <a:t>14</a:t>
             </a:fld>
             <a:endParaRPr lang="en-US" dirty="0"/>
           </a:p>
@@ -16485,7 +16205,7 @@
 </p:sld>
 </file>
 
-<file path=ppt/slides/slide16.xml><?xml version="1.0" encoding="utf-8"?>
+<file path=ppt/slides/slide15.xml><?xml version="1.0" encoding="utf-8"?>
 <p:sld xmlns:a="http://schemas.openxmlformats.org/drawingml/2006/main" xmlns:r="http://schemas.openxmlformats.org/officeDocument/2006/relationships" xmlns:p="http://schemas.openxmlformats.org/presentationml/2006/main">
   <p:cSld>
     <p:spTree>
@@ -16525,7 +16245,7 @@
           <a:p>
             <a:fld id="{6700A58B-DD98-43D0-B791-721480A02982}" type="datetime1">
               <a:rPr lang="en-US" smtClean="0"/>
-              <a:t>6/9/24</a:t>
+              <a:t>6/14/24</a:t>
             </a:fld>
             <a:endParaRPr lang="en-US"/>
           </a:p>
@@ -16612,7 +16332,7 @@
             <a:fld id="{37290FF7-652B-4475-AEAB-8B1A5D23AE09}" type="slidenum">
               <a:rPr lang="en-US" smtClean="0"/>
               <a:pPr/>
-              <a:t>16</a:t>
+              <a:t>15</a:t>
             </a:fld>
             <a:endParaRPr lang="en-US" dirty="0"/>
           </a:p>
@@ -17219,7 +16939,7 @@
 </p:sld>
 </file>
 
-<file path=ppt/slides/slide17.xml><?xml version="1.0" encoding="utf-8"?>
+<file path=ppt/slides/slide16.xml><?xml version="1.0" encoding="utf-8"?>
 <p:sld xmlns:a="http://schemas.openxmlformats.org/drawingml/2006/main" xmlns:r="http://schemas.openxmlformats.org/officeDocument/2006/relationships" xmlns:p="http://schemas.openxmlformats.org/presentationml/2006/main">
   <p:cSld>
     <p:spTree>
@@ -17259,7 +16979,7 @@
           <a:p>
             <a:fld id="{6700A58B-DD98-43D0-B791-721480A02982}" type="datetime1">
               <a:rPr lang="en-US" smtClean="0"/>
-              <a:t>6/9/24</a:t>
+              <a:t>6/14/24</a:t>
             </a:fld>
             <a:endParaRPr lang="en-US"/>
           </a:p>
@@ -17346,7 +17066,7 @@
             <a:fld id="{37290FF7-652B-4475-AEAB-8B1A5D23AE09}" type="slidenum">
               <a:rPr lang="en-US" smtClean="0"/>
               <a:pPr/>
-              <a:t>17</a:t>
+              <a:t>16</a:t>
             </a:fld>
             <a:endParaRPr lang="en-US" dirty="0"/>
           </a:p>
@@ -18267,7 +17987,7 @@
 </p:sld>
 </file>
 
-<file path=ppt/slides/slide18.xml><?xml version="1.0" encoding="utf-8"?>
+<file path=ppt/slides/slide17.xml><?xml version="1.0" encoding="utf-8"?>
 <p:sld xmlns:a="http://schemas.openxmlformats.org/drawingml/2006/main" xmlns:r="http://schemas.openxmlformats.org/officeDocument/2006/relationships" xmlns:p="http://schemas.openxmlformats.org/presentationml/2006/main">
   <p:cSld>
     <p:spTree>
@@ -18307,7 +18027,7 @@
           <a:p>
             <a:fld id="{6700A58B-DD98-43D0-B791-721480A02982}" type="datetime1">
               <a:rPr lang="en-US" smtClean="0"/>
-              <a:t>6/9/24</a:t>
+              <a:t>6/14/24</a:t>
             </a:fld>
             <a:endParaRPr lang="en-US"/>
           </a:p>
@@ -18394,7 +18114,7 @@
             <a:fld id="{37290FF7-652B-4475-AEAB-8B1A5D23AE09}" type="slidenum">
               <a:rPr lang="en-US" smtClean="0"/>
               <a:pPr/>
-              <a:t>18</a:t>
+              <a:t>17</a:t>
             </a:fld>
             <a:endParaRPr lang="en-US" dirty="0"/>
           </a:p>
@@ -19323,7 +19043,7 @@
 </p:sld>
 </file>
 
-<file path=ppt/slides/slide19.xml><?xml version="1.0" encoding="utf-8"?>
+<file path=ppt/slides/slide18.xml><?xml version="1.0" encoding="utf-8"?>
 <p:sld xmlns:a="http://schemas.openxmlformats.org/drawingml/2006/main" xmlns:r="http://schemas.openxmlformats.org/officeDocument/2006/relationships" xmlns:p="http://schemas.openxmlformats.org/presentationml/2006/main">
   <p:cSld>
     <p:spTree>
@@ -19363,7 +19083,7 @@
           <a:p>
             <a:fld id="{6700A58B-DD98-43D0-B791-721480A02982}" type="datetime1">
               <a:rPr lang="en-US" smtClean="0"/>
-              <a:t>6/9/24</a:t>
+              <a:t>6/14/24</a:t>
             </a:fld>
             <a:endParaRPr lang="en-US"/>
           </a:p>
@@ -19450,7 +19170,7 @@
             <a:fld id="{37290FF7-652B-4475-AEAB-8B1A5D23AE09}" type="slidenum">
               <a:rPr lang="en-US" smtClean="0"/>
               <a:pPr/>
-              <a:t>19</a:t>
+              <a:t>18</a:t>
             </a:fld>
             <a:endParaRPr lang="en-US" dirty="0"/>
           </a:p>
@@ -20223,306 +19943,7 @@
 </p:sld>
 </file>
 
-<file path=ppt/slides/slide2.xml><?xml version="1.0" encoding="utf-8"?>
-<p:sld xmlns:a="http://schemas.openxmlformats.org/drawingml/2006/main" xmlns:r="http://schemas.openxmlformats.org/officeDocument/2006/relationships" xmlns:p="http://schemas.openxmlformats.org/presentationml/2006/main">
-  <p:cSld>
-    <p:spTree>
-      <p:nvGrpSpPr>
-        <p:cNvPr id="1" name=""/>
-        <p:cNvGrpSpPr/>
-        <p:nvPr/>
-      </p:nvGrpSpPr>
-      <p:grpSpPr>
-        <a:xfrm>
-          <a:off x="0" y="0"/>
-          <a:ext cx="0" cy="0"/>
-          <a:chOff x="0" y="0"/>
-          <a:chExt cx="0" cy="0"/>
-        </a:xfrm>
-      </p:grpSpPr>
-      <p:sp>
-        <p:nvSpPr>
-          <p:cNvPr id="2" name="Date Placeholder 1">
-            <a:extLst>
-              <a:ext uri="{FF2B5EF4-FFF2-40B4-BE49-F238E27FC236}">
-                <a16:creationId xmlns:a16="http://schemas.microsoft.com/office/drawing/2014/main" id="{22B22776-A38F-49A5-BB26-5D9674C103AC}"/>
-              </a:ext>
-            </a:extLst>
-          </p:cNvPr>
-          <p:cNvSpPr>
-            <a:spLocks noGrp="1"/>
-          </p:cNvSpPr>
-          <p:nvPr>
-            <p:ph type="dt" sz="half" idx="10"/>
-          </p:nvPr>
-        </p:nvSpPr>
-        <p:spPr/>
-        <p:txBody>
-          <a:bodyPr/>
-          <a:lstStyle/>
-          <a:p>
-            <a:fld id="{6700A58B-DD98-43D0-B791-721480A02982}" type="datetime1">
-              <a:rPr lang="en-US" smtClean="0"/>
-              <a:t>6/9/24</a:t>
-            </a:fld>
-            <a:endParaRPr lang="en-US"/>
-          </a:p>
-        </p:txBody>
-      </p:sp>
-      <p:sp>
-        <p:nvSpPr>
-          <p:cNvPr id="3" name="Title 2">
-            <a:extLst>
-              <a:ext uri="{FF2B5EF4-FFF2-40B4-BE49-F238E27FC236}">
-                <a16:creationId xmlns:a16="http://schemas.microsoft.com/office/drawing/2014/main" id="{39988D48-8216-465C-83C2-8A7495E78ECF}"/>
-              </a:ext>
-            </a:extLst>
-          </p:cNvPr>
-          <p:cNvSpPr>
-            <a:spLocks noGrp="1"/>
-          </p:cNvSpPr>
-          <p:nvPr>
-            <p:ph type="title"/>
-          </p:nvPr>
-        </p:nvSpPr>
-        <p:spPr/>
-        <p:txBody>
-          <a:bodyPr/>
-          <a:lstStyle/>
-          <a:p>
-            <a:r>
-              <a:rPr lang="en-US" dirty="0"/>
-              <a:t>Hospital Readmissions is a problem</a:t>
-            </a:r>
-          </a:p>
-        </p:txBody>
-      </p:sp>
-      <p:sp>
-        <p:nvSpPr>
-          <p:cNvPr id="4" name="Footer Placeholder 3">
-            <a:extLst>
-              <a:ext uri="{FF2B5EF4-FFF2-40B4-BE49-F238E27FC236}">
-                <a16:creationId xmlns:a16="http://schemas.microsoft.com/office/drawing/2014/main" id="{BCD156DB-1790-45BC-B356-942101765088}"/>
-              </a:ext>
-            </a:extLst>
-          </p:cNvPr>
-          <p:cNvSpPr>
-            <a:spLocks noGrp="1"/>
-          </p:cNvSpPr>
-          <p:nvPr>
-            <p:ph type="ftr" sz="quarter" idx="3"/>
-          </p:nvPr>
-        </p:nvSpPr>
-        <p:spPr/>
-        <p:txBody>
-          <a:bodyPr/>
-          <a:lstStyle/>
-          <a:p>
-            <a:r>
-              <a:rPr lang="en-US"/>
-              <a:t>Kwartler</a:t>
-            </a:r>
-            <a:endParaRPr lang="en-US" dirty="0"/>
-          </a:p>
-        </p:txBody>
-      </p:sp>
-      <p:sp>
-        <p:nvSpPr>
-          <p:cNvPr id="5" name="Slide Number Placeholder 4">
-            <a:extLst>
-              <a:ext uri="{FF2B5EF4-FFF2-40B4-BE49-F238E27FC236}">
-                <a16:creationId xmlns:a16="http://schemas.microsoft.com/office/drawing/2014/main" id="{213E6CFE-F5DD-4A8C-A9F2-13B5C90794AD}"/>
-              </a:ext>
-            </a:extLst>
-          </p:cNvPr>
-          <p:cNvSpPr>
-            <a:spLocks noGrp="1"/>
-          </p:cNvSpPr>
-          <p:nvPr>
-            <p:ph type="sldNum" sz="quarter" idx="4"/>
-          </p:nvPr>
-        </p:nvSpPr>
-        <p:spPr/>
-        <p:txBody>
-          <a:bodyPr/>
-          <a:lstStyle/>
-          <a:p>
-            <a:fld id="{37290FF7-652B-4475-AEAB-8B1A5D23AE09}" type="slidenum">
-              <a:rPr lang="en-US" smtClean="0"/>
-              <a:pPr/>
-              <a:t>2</a:t>
-            </a:fld>
-            <a:endParaRPr lang="en-US" dirty="0"/>
-          </a:p>
-        </p:txBody>
-      </p:sp>
-      <p:sp>
-        <p:nvSpPr>
-          <p:cNvPr id="6" name="TextBox 5"/>
-          <p:cNvSpPr txBox="1"/>
-          <p:nvPr/>
-        </p:nvSpPr>
-        <p:spPr>
-          <a:xfrm>
-            <a:off x="126124" y="2238704"/>
-            <a:ext cx="8655269" cy="2677656"/>
-          </a:xfrm>
-          <a:prstGeom prst="rect">
-            <a:avLst/>
-          </a:prstGeom>
-          <a:noFill/>
-        </p:spPr>
-        <p:txBody>
-          <a:bodyPr wrap="square" rtlCol="0">
-            <a:spAutoFit/>
-          </a:bodyPr>
-          <a:lstStyle/>
-          <a:p>
-            <a:pPr marL="285750" indent="-285750">
-              <a:buFont typeface="Arial" panose="020B0604020202020204" pitchFamily="34" charset="0"/>
-              <a:buChar char="•"/>
-            </a:pPr>
-            <a:r>
-              <a:rPr lang="en-US" sz="2400" dirty="0"/>
-              <a:t>$41B spent annually treating patients within 30 days of their initial discharge</a:t>
-            </a:r>
-          </a:p>
-          <a:p>
-            <a:pPr marL="285750" indent="-285750">
-              <a:buFont typeface="Arial" panose="020B0604020202020204" pitchFamily="34" charset="0"/>
-              <a:buChar char="•"/>
-            </a:pPr>
-            <a:endParaRPr lang="en-US" sz="2400" dirty="0"/>
-          </a:p>
-          <a:p>
-            <a:pPr marL="285750" indent="-285750">
-              <a:buFont typeface="Arial" panose="020B0604020202020204" pitchFamily="34" charset="0"/>
-              <a:buChar char="•"/>
-            </a:pPr>
-            <a:r>
-              <a:rPr lang="en-US" sz="2400" dirty="0"/>
-              <a:t>Government programs Medicare/Medicaid fine hospitals for readmissions driving up costs</a:t>
-            </a:r>
-          </a:p>
-          <a:p>
-            <a:pPr marL="285750" indent="-285750">
-              <a:buFont typeface="Arial" panose="020B0604020202020204" pitchFamily="34" charset="0"/>
-              <a:buChar char="•"/>
-            </a:pPr>
-            <a:endParaRPr lang="en-US" sz="2400" dirty="0"/>
-          </a:p>
-          <a:p>
-            <a:pPr marL="285750" indent="-285750">
-              <a:buFont typeface="Arial" panose="020B0604020202020204" pitchFamily="34" charset="0"/>
-              <a:buChar char="•"/>
-            </a:pPr>
-            <a:r>
-              <a:rPr lang="en-US" sz="2400" dirty="0"/>
-              <a:t>Additional patient hardship, stress &amp; strain</a:t>
-            </a:r>
-          </a:p>
-        </p:txBody>
-      </p:sp>
-      <p:cxnSp>
-        <p:nvCxnSpPr>
-          <p:cNvPr id="7" name="Straight Connector 6">
-            <a:extLst>
-              <a:ext uri="{FF2B5EF4-FFF2-40B4-BE49-F238E27FC236}">
-                <a16:creationId xmlns:a16="http://schemas.microsoft.com/office/drawing/2014/main" id="{1E7E0CE9-7483-B24A-A9C1-2D7C5E09BC3A}"/>
-              </a:ext>
-            </a:extLst>
-          </p:cNvPr>
-          <p:cNvCxnSpPr/>
-          <p:nvPr/>
-        </p:nvCxnSpPr>
-        <p:spPr>
-          <a:xfrm>
-            <a:off x="6798363" y="6549885"/>
-            <a:ext cx="0" cy="182880"/>
-          </a:xfrm>
-          <a:prstGeom prst="line">
-            <a:avLst/>
-          </a:prstGeom>
-          <a:ln>
-            <a:solidFill>
-              <a:schemeClr val="bg1">
-                <a:lumMod val="85000"/>
-              </a:schemeClr>
-            </a:solidFill>
-          </a:ln>
-        </p:spPr>
-        <p:style>
-          <a:lnRef idx="1">
-            <a:schemeClr val="accent1"/>
-          </a:lnRef>
-          <a:fillRef idx="0">
-            <a:schemeClr val="accent1"/>
-          </a:fillRef>
-          <a:effectRef idx="0">
-            <a:schemeClr val="accent1"/>
-          </a:effectRef>
-          <a:fontRef idx="minor">
-            <a:schemeClr val="tx1"/>
-          </a:fontRef>
-        </p:style>
-      </p:cxnSp>
-      <p:cxnSp>
-        <p:nvCxnSpPr>
-          <p:cNvPr id="8" name="Straight Connector 7">
-            <a:extLst>
-              <a:ext uri="{FF2B5EF4-FFF2-40B4-BE49-F238E27FC236}">
-                <a16:creationId xmlns:a16="http://schemas.microsoft.com/office/drawing/2014/main" id="{D0A2EE27-3E52-BD4E-AA58-853A6E6E8B0C}"/>
-              </a:ext>
-            </a:extLst>
-          </p:cNvPr>
-          <p:cNvCxnSpPr/>
-          <p:nvPr/>
-        </p:nvCxnSpPr>
-        <p:spPr>
-          <a:xfrm>
-            <a:off x="7076661" y="4664763"/>
-            <a:ext cx="182880" cy="0"/>
-          </a:xfrm>
-          <a:prstGeom prst="line">
-            <a:avLst/>
-          </a:prstGeom>
-          <a:ln>
-            <a:solidFill>
-              <a:schemeClr val="bg1">
-                <a:lumMod val="85000"/>
-              </a:schemeClr>
-            </a:solidFill>
-          </a:ln>
-        </p:spPr>
-        <p:style>
-          <a:lnRef idx="1">
-            <a:schemeClr val="accent1"/>
-          </a:lnRef>
-          <a:fillRef idx="0">
-            <a:schemeClr val="accent1"/>
-          </a:fillRef>
-          <a:effectRef idx="0">
-            <a:schemeClr val="accent1"/>
-          </a:effectRef>
-          <a:fontRef idx="minor">
-            <a:schemeClr val="tx1"/>
-          </a:fontRef>
-        </p:style>
-      </p:cxnSp>
-    </p:spTree>
-    <p:extLst>
-      <p:ext uri="{BB962C8B-B14F-4D97-AF65-F5344CB8AC3E}">
-        <p14:creationId xmlns:p14="http://schemas.microsoft.com/office/powerpoint/2010/main" val="408098594"/>
-      </p:ext>
-    </p:extLst>
-  </p:cSld>
-  <p:clrMapOvr>
-    <a:masterClrMapping/>
-  </p:clrMapOvr>
-</p:sld>
-</file>
-
-<file path=ppt/slides/slide20.xml><?xml version="1.0" encoding="utf-8"?>
+<file path=ppt/slides/slide19.xml><?xml version="1.0" encoding="utf-8"?>
 <p:sld xmlns:a="http://schemas.openxmlformats.org/drawingml/2006/main" xmlns:r="http://schemas.openxmlformats.org/officeDocument/2006/relationships" xmlns:p="http://schemas.openxmlformats.org/presentationml/2006/main">
   <p:cSld>
     <p:spTree>
@@ -20562,7 +19983,7 @@
           <a:p>
             <a:fld id="{6700A58B-DD98-43D0-B791-721480A02982}" type="datetime1">
               <a:rPr lang="en-US" smtClean="0"/>
-              <a:t>6/9/24</a:t>
+              <a:t>6/14/24</a:t>
             </a:fld>
             <a:endParaRPr lang="en-US"/>
           </a:p>
@@ -20649,7 +20070,7 @@
             <a:fld id="{37290FF7-652B-4475-AEAB-8B1A5D23AE09}" type="slidenum">
               <a:rPr lang="en-US" smtClean="0"/>
               <a:pPr/>
-              <a:t>20</a:t>
+              <a:t>19</a:t>
             </a:fld>
             <a:endParaRPr lang="en-US" dirty="0"/>
           </a:p>
@@ -21762,7 +21183,306 @@
 </p:sld>
 </file>
 
-<file path=ppt/slides/slide21.xml><?xml version="1.0" encoding="utf-8"?>
+<file path=ppt/slides/slide2.xml><?xml version="1.0" encoding="utf-8"?>
+<p:sld xmlns:a="http://schemas.openxmlformats.org/drawingml/2006/main" xmlns:r="http://schemas.openxmlformats.org/officeDocument/2006/relationships" xmlns:p="http://schemas.openxmlformats.org/presentationml/2006/main">
+  <p:cSld>
+    <p:spTree>
+      <p:nvGrpSpPr>
+        <p:cNvPr id="1" name=""/>
+        <p:cNvGrpSpPr/>
+        <p:nvPr/>
+      </p:nvGrpSpPr>
+      <p:grpSpPr>
+        <a:xfrm>
+          <a:off x="0" y="0"/>
+          <a:ext cx="0" cy="0"/>
+          <a:chOff x="0" y="0"/>
+          <a:chExt cx="0" cy="0"/>
+        </a:xfrm>
+      </p:grpSpPr>
+      <p:sp>
+        <p:nvSpPr>
+          <p:cNvPr id="2" name="Date Placeholder 1">
+            <a:extLst>
+              <a:ext uri="{FF2B5EF4-FFF2-40B4-BE49-F238E27FC236}">
+                <a16:creationId xmlns:a16="http://schemas.microsoft.com/office/drawing/2014/main" id="{22B22776-A38F-49A5-BB26-5D9674C103AC}"/>
+              </a:ext>
+            </a:extLst>
+          </p:cNvPr>
+          <p:cNvSpPr>
+            <a:spLocks noGrp="1"/>
+          </p:cNvSpPr>
+          <p:nvPr>
+            <p:ph type="dt" sz="half" idx="10"/>
+          </p:nvPr>
+        </p:nvSpPr>
+        <p:spPr/>
+        <p:txBody>
+          <a:bodyPr/>
+          <a:lstStyle/>
+          <a:p>
+            <a:fld id="{6700A58B-DD98-43D0-B791-721480A02982}" type="datetime1">
+              <a:rPr lang="en-US" smtClean="0"/>
+              <a:t>6/14/24</a:t>
+            </a:fld>
+            <a:endParaRPr lang="en-US"/>
+          </a:p>
+        </p:txBody>
+      </p:sp>
+      <p:sp>
+        <p:nvSpPr>
+          <p:cNvPr id="3" name="Title 2">
+            <a:extLst>
+              <a:ext uri="{FF2B5EF4-FFF2-40B4-BE49-F238E27FC236}">
+                <a16:creationId xmlns:a16="http://schemas.microsoft.com/office/drawing/2014/main" id="{39988D48-8216-465C-83C2-8A7495E78ECF}"/>
+              </a:ext>
+            </a:extLst>
+          </p:cNvPr>
+          <p:cNvSpPr>
+            <a:spLocks noGrp="1"/>
+          </p:cNvSpPr>
+          <p:nvPr>
+            <p:ph type="title"/>
+          </p:nvPr>
+        </p:nvSpPr>
+        <p:spPr/>
+        <p:txBody>
+          <a:bodyPr/>
+          <a:lstStyle/>
+          <a:p>
+            <a:r>
+              <a:rPr lang="en-US" dirty="0"/>
+              <a:t>Hospital Readmissions is a problem</a:t>
+            </a:r>
+          </a:p>
+        </p:txBody>
+      </p:sp>
+      <p:sp>
+        <p:nvSpPr>
+          <p:cNvPr id="4" name="Footer Placeholder 3">
+            <a:extLst>
+              <a:ext uri="{FF2B5EF4-FFF2-40B4-BE49-F238E27FC236}">
+                <a16:creationId xmlns:a16="http://schemas.microsoft.com/office/drawing/2014/main" id="{BCD156DB-1790-45BC-B356-942101765088}"/>
+              </a:ext>
+            </a:extLst>
+          </p:cNvPr>
+          <p:cNvSpPr>
+            <a:spLocks noGrp="1"/>
+          </p:cNvSpPr>
+          <p:nvPr>
+            <p:ph type="ftr" sz="quarter" idx="3"/>
+          </p:nvPr>
+        </p:nvSpPr>
+        <p:spPr/>
+        <p:txBody>
+          <a:bodyPr/>
+          <a:lstStyle/>
+          <a:p>
+            <a:r>
+              <a:rPr lang="en-US"/>
+              <a:t>Kwartler</a:t>
+            </a:r>
+            <a:endParaRPr lang="en-US" dirty="0"/>
+          </a:p>
+        </p:txBody>
+      </p:sp>
+      <p:sp>
+        <p:nvSpPr>
+          <p:cNvPr id="5" name="Slide Number Placeholder 4">
+            <a:extLst>
+              <a:ext uri="{FF2B5EF4-FFF2-40B4-BE49-F238E27FC236}">
+                <a16:creationId xmlns:a16="http://schemas.microsoft.com/office/drawing/2014/main" id="{213E6CFE-F5DD-4A8C-A9F2-13B5C90794AD}"/>
+              </a:ext>
+            </a:extLst>
+          </p:cNvPr>
+          <p:cNvSpPr>
+            <a:spLocks noGrp="1"/>
+          </p:cNvSpPr>
+          <p:nvPr>
+            <p:ph type="sldNum" sz="quarter" idx="4"/>
+          </p:nvPr>
+        </p:nvSpPr>
+        <p:spPr/>
+        <p:txBody>
+          <a:bodyPr/>
+          <a:lstStyle/>
+          <a:p>
+            <a:fld id="{37290FF7-652B-4475-AEAB-8B1A5D23AE09}" type="slidenum">
+              <a:rPr lang="en-US" smtClean="0"/>
+              <a:pPr/>
+              <a:t>2</a:t>
+            </a:fld>
+            <a:endParaRPr lang="en-US" dirty="0"/>
+          </a:p>
+        </p:txBody>
+      </p:sp>
+      <p:sp>
+        <p:nvSpPr>
+          <p:cNvPr id="6" name="TextBox 5"/>
+          <p:cNvSpPr txBox="1"/>
+          <p:nvPr/>
+        </p:nvSpPr>
+        <p:spPr>
+          <a:xfrm>
+            <a:off x="126124" y="2238704"/>
+            <a:ext cx="8655269" cy="2677656"/>
+          </a:xfrm>
+          <a:prstGeom prst="rect">
+            <a:avLst/>
+          </a:prstGeom>
+          <a:noFill/>
+        </p:spPr>
+        <p:txBody>
+          <a:bodyPr wrap="square" rtlCol="0">
+            <a:spAutoFit/>
+          </a:bodyPr>
+          <a:lstStyle/>
+          <a:p>
+            <a:pPr marL="285750" indent="-285750">
+              <a:buFont typeface="Arial" panose="020B0604020202020204" pitchFamily="34" charset="0"/>
+              <a:buChar char="•"/>
+            </a:pPr>
+            <a:r>
+              <a:rPr lang="en-US" sz="2400" dirty="0"/>
+              <a:t>$41B spent annually treating patients within 30 days of their initial discharge</a:t>
+            </a:r>
+          </a:p>
+          <a:p>
+            <a:pPr marL="285750" indent="-285750">
+              <a:buFont typeface="Arial" panose="020B0604020202020204" pitchFamily="34" charset="0"/>
+              <a:buChar char="•"/>
+            </a:pPr>
+            <a:endParaRPr lang="en-US" sz="2400" dirty="0"/>
+          </a:p>
+          <a:p>
+            <a:pPr marL="285750" indent="-285750">
+              <a:buFont typeface="Arial" panose="020B0604020202020204" pitchFamily="34" charset="0"/>
+              <a:buChar char="•"/>
+            </a:pPr>
+            <a:r>
+              <a:rPr lang="en-US" sz="2400" dirty="0"/>
+              <a:t>Government programs Medicare/Medicaid fine hospitals for readmissions driving up costs</a:t>
+            </a:r>
+          </a:p>
+          <a:p>
+            <a:pPr marL="285750" indent="-285750">
+              <a:buFont typeface="Arial" panose="020B0604020202020204" pitchFamily="34" charset="0"/>
+              <a:buChar char="•"/>
+            </a:pPr>
+            <a:endParaRPr lang="en-US" sz="2400" dirty="0"/>
+          </a:p>
+          <a:p>
+            <a:pPr marL="285750" indent="-285750">
+              <a:buFont typeface="Arial" panose="020B0604020202020204" pitchFamily="34" charset="0"/>
+              <a:buChar char="•"/>
+            </a:pPr>
+            <a:r>
+              <a:rPr lang="en-US" sz="2400" dirty="0"/>
+              <a:t>Additional patient hardship, stress &amp; strain</a:t>
+            </a:r>
+          </a:p>
+        </p:txBody>
+      </p:sp>
+      <p:cxnSp>
+        <p:nvCxnSpPr>
+          <p:cNvPr id="7" name="Straight Connector 6">
+            <a:extLst>
+              <a:ext uri="{FF2B5EF4-FFF2-40B4-BE49-F238E27FC236}">
+                <a16:creationId xmlns:a16="http://schemas.microsoft.com/office/drawing/2014/main" id="{1E7E0CE9-7483-B24A-A9C1-2D7C5E09BC3A}"/>
+              </a:ext>
+            </a:extLst>
+          </p:cNvPr>
+          <p:cNvCxnSpPr/>
+          <p:nvPr/>
+        </p:nvCxnSpPr>
+        <p:spPr>
+          <a:xfrm>
+            <a:off x="6798363" y="6549885"/>
+            <a:ext cx="0" cy="182880"/>
+          </a:xfrm>
+          <a:prstGeom prst="line">
+            <a:avLst/>
+          </a:prstGeom>
+          <a:ln>
+            <a:solidFill>
+              <a:schemeClr val="bg1">
+                <a:lumMod val="85000"/>
+              </a:schemeClr>
+            </a:solidFill>
+          </a:ln>
+        </p:spPr>
+        <p:style>
+          <a:lnRef idx="1">
+            <a:schemeClr val="accent1"/>
+          </a:lnRef>
+          <a:fillRef idx="0">
+            <a:schemeClr val="accent1"/>
+          </a:fillRef>
+          <a:effectRef idx="0">
+            <a:schemeClr val="accent1"/>
+          </a:effectRef>
+          <a:fontRef idx="minor">
+            <a:schemeClr val="tx1"/>
+          </a:fontRef>
+        </p:style>
+      </p:cxnSp>
+      <p:cxnSp>
+        <p:nvCxnSpPr>
+          <p:cNvPr id="8" name="Straight Connector 7">
+            <a:extLst>
+              <a:ext uri="{FF2B5EF4-FFF2-40B4-BE49-F238E27FC236}">
+                <a16:creationId xmlns:a16="http://schemas.microsoft.com/office/drawing/2014/main" id="{D0A2EE27-3E52-BD4E-AA58-853A6E6E8B0C}"/>
+              </a:ext>
+            </a:extLst>
+          </p:cNvPr>
+          <p:cNvCxnSpPr/>
+          <p:nvPr/>
+        </p:nvCxnSpPr>
+        <p:spPr>
+          <a:xfrm>
+            <a:off x="7076661" y="4664763"/>
+            <a:ext cx="182880" cy="0"/>
+          </a:xfrm>
+          <a:prstGeom prst="line">
+            <a:avLst/>
+          </a:prstGeom>
+          <a:ln>
+            <a:solidFill>
+              <a:schemeClr val="bg1">
+                <a:lumMod val="85000"/>
+              </a:schemeClr>
+            </a:solidFill>
+          </a:ln>
+        </p:spPr>
+        <p:style>
+          <a:lnRef idx="1">
+            <a:schemeClr val="accent1"/>
+          </a:lnRef>
+          <a:fillRef idx="0">
+            <a:schemeClr val="accent1"/>
+          </a:fillRef>
+          <a:effectRef idx="0">
+            <a:schemeClr val="accent1"/>
+          </a:effectRef>
+          <a:fontRef idx="minor">
+            <a:schemeClr val="tx1"/>
+          </a:fontRef>
+        </p:style>
+      </p:cxnSp>
+    </p:spTree>
+    <p:extLst>
+      <p:ext uri="{BB962C8B-B14F-4D97-AF65-F5344CB8AC3E}">
+        <p14:creationId xmlns:p14="http://schemas.microsoft.com/office/powerpoint/2010/main" val="408098594"/>
+      </p:ext>
+    </p:extLst>
+  </p:cSld>
+  <p:clrMapOvr>
+    <a:masterClrMapping/>
+  </p:clrMapOvr>
+</p:sld>
+</file>
+
+<file path=ppt/slides/slide20.xml><?xml version="1.0" encoding="utf-8"?>
 <p:sld xmlns:a="http://schemas.openxmlformats.org/drawingml/2006/main" xmlns:r="http://schemas.openxmlformats.org/officeDocument/2006/relationships" xmlns:p="http://schemas.openxmlformats.org/presentationml/2006/main">
   <p:cSld>
     <p:spTree>
@@ -21802,7 +21522,7 @@
           <a:p>
             <a:fld id="{6700A58B-DD98-43D0-B791-721480A02982}" type="datetime1">
               <a:rPr lang="en-US" smtClean="0"/>
-              <a:t>6/9/24</a:t>
+              <a:t>6/14/24</a:t>
             </a:fld>
             <a:endParaRPr lang="en-US"/>
           </a:p>
@@ -21889,7 +21609,7 @@
             <a:fld id="{37290FF7-652B-4475-AEAB-8B1A5D23AE09}" type="slidenum">
               <a:rPr lang="en-US" smtClean="0"/>
               <a:pPr/>
-              <a:t>21</a:t>
+              <a:t>20</a:t>
             </a:fld>
             <a:endParaRPr lang="en-US" dirty="0"/>
           </a:p>
@@ -22859,6 +22579,286 @@
 </p:sld>
 </file>
 
+<file path=ppt/slides/slide21.xml><?xml version="1.0" encoding="utf-8"?>
+<p:sld xmlns:a="http://schemas.openxmlformats.org/drawingml/2006/main" xmlns:r="http://schemas.openxmlformats.org/officeDocument/2006/relationships" xmlns:p="http://schemas.openxmlformats.org/presentationml/2006/main">
+  <p:cSld>
+    <p:spTree>
+      <p:nvGrpSpPr>
+        <p:cNvPr id="1" name=""/>
+        <p:cNvGrpSpPr/>
+        <p:nvPr/>
+      </p:nvGrpSpPr>
+      <p:grpSpPr>
+        <a:xfrm>
+          <a:off x="0" y="0"/>
+          <a:ext cx="0" cy="0"/>
+          <a:chOff x="0" y="0"/>
+          <a:chExt cx="0" cy="0"/>
+        </a:xfrm>
+      </p:grpSpPr>
+      <p:sp>
+        <p:nvSpPr>
+          <p:cNvPr id="2" name="Date Placeholder 1">
+            <a:extLst>
+              <a:ext uri="{FF2B5EF4-FFF2-40B4-BE49-F238E27FC236}">
+                <a16:creationId xmlns:a16="http://schemas.microsoft.com/office/drawing/2014/main" id="{ECC9EAEF-AC39-4F46-A876-835A218CE916}"/>
+              </a:ext>
+            </a:extLst>
+          </p:cNvPr>
+          <p:cNvSpPr>
+            <a:spLocks noGrp="1"/>
+          </p:cNvSpPr>
+          <p:nvPr>
+            <p:ph type="dt" sz="half" idx="10"/>
+          </p:nvPr>
+        </p:nvSpPr>
+        <p:spPr/>
+        <p:txBody>
+          <a:bodyPr/>
+          <a:lstStyle/>
+          <a:p>
+            <a:fld id="{6700A58B-DD98-43D0-B791-721480A02982}" type="datetime1">
+              <a:rPr lang="en-US" smtClean="0"/>
+              <a:t>6/14/24</a:t>
+            </a:fld>
+            <a:endParaRPr lang="en-US"/>
+          </a:p>
+        </p:txBody>
+      </p:sp>
+      <p:sp>
+        <p:nvSpPr>
+          <p:cNvPr id="3" name="Title 2">
+            <a:extLst>
+              <a:ext uri="{FF2B5EF4-FFF2-40B4-BE49-F238E27FC236}">
+                <a16:creationId xmlns:a16="http://schemas.microsoft.com/office/drawing/2014/main" id="{C68D9455-329F-447E-98A3-DD3FB11137D9}"/>
+              </a:ext>
+            </a:extLst>
+          </p:cNvPr>
+          <p:cNvSpPr>
+            <a:spLocks noGrp="1"/>
+          </p:cNvSpPr>
+          <p:nvPr>
+            <p:ph type="title"/>
+          </p:nvPr>
+        </p:nvSpPr>
+        <p:spPr/>
+        <p:txBody>
+          <a:bodyPr/>
+          <a:lstStyle/>
+          <a:p>
+            <a:r>
+              <a:rPr lang="en-US" dirty="0" err="1"/>
+              <a:t>D_ElasticNetExample.R</a:t>
+            </a:r>
+            <a:endParaRPr lang="en-US" dirty="0"/>
+          </a:p>
+        </p:txBody>
+      </p:sp>
+      <p:sp>
+        <p:nvSpPr>
+          <p:cNvPr id="4" name="Footer Placeholder 3">
+            <a:extLst>
+              <a:ext uri="{FF2B5EF4-FFF2-40B4-BE49-F238E27FC236}">
+                <a16:creationId xmlns:a16="http://schemas.microsoft.com/office/drawing/2014/main" id="{AAF96DF4-DEB8-4A32-97BF-72315D909EE9}"/>
+              </a:ext>
+            </a:extLst>
+          </p:cNvPr>
+          <p:cNvSpPr>
+            <a:spLocks noGrp="1"/>
+          </p:cNvSpPr>
+          <p:nvPr>
+            <p:ph type="ftr" sz="quarter" idx="3"/>
+          </p:nvPr>
+        </p:nvSpPr>
+        <p:spPr/>
+        <p:txBody>
+          <a:bodyPr/>
+          <a:lstStyle/>
+          <a:p>
+            <a:r>
+              <a:rPr lang="en-US"/>
+              <a:t>Kwartler</a:t>
+            </a:r>
+            <a:endParaRPr lang="en-US" dirty="0"/>
+          </a:p>
+        </p:txBody>
+      </p:sp>
+      <p:sp>
+        <p:nvSpPr>
+          <p:cNvPr id="5" name="Slide Number Placeholder 4">
+            <a:extLst>
+              <a:ext uri="{FF2B5EF4-FFF2-40B4-BE49-F238E27FC236}">
+                <a16:creationId xmlns:a16="http://schemas.microsoft.com/office/drawing/2014/main" id="{296BF0B2-5E54-4380-8ECC-7D4A0500B1D2}"/>
+              </a:ext>
+            </a:extLst>
+          </p:cNvPr>
+          <p:cNvSpPr>
+            <a:spLocks noGrp="1"/>
+          </p:cNvSpPr>
+          <p:nvPr>
+            <p:ph type="sldNum" sz="quarter" idx="4"/>
+          </p:nvPr>
+        </p:nvSpPr>
+        <p:spPr/>
+        <p:txBody>
+          <a:bodyPr/>
+          <a:lstStyle/>
+          <a:p>
+            <a:fld id="{37290FF7-652B-4475-AEAB-8B1A5D23AE09}" type="slidenum">
+              <a:rPr lang="en-US" smtClean="0"/>
+              <a:pPr/>
+              <a:t>21</a:t>
+            </a:fld>
+            <a:endParaRPr lang="en-US" dirty="0"/>
+          </a:p>
+        </p:txBody>
+      </p:sp>
+      <p:pic>
+        <p:nvPicPr>
+          <p:cNvPr id="5122" name="Picture 2" descr="Image result for hospital  meme">
+            <a:extLst>
+              <a:ext uri="{FF2B5EF4-FFF2-40B4-BE49-F238E27FC236}">
+                <a16:creationId xmlns:a16="http://schemas.microsoft.com/office/drawing/2014/main" id="{51CC7F37-F786-4DE2-91E8-A86E347DECCD}"/>
+              </a:ext>
+            </a:extLst>
+          </p:cNvPr>
+          <p:cNvPicPr>
+            <a:picLocks noChangeAspect="1" noChangeArrowheads="1"/>
+          </p:cNvPicPr>
+          <p:nvPr/>
+        </p:nvPicPr>
+        <p:blipFill>
+          <a:blip r:embed="rId2">
+            <a:extLst>
+              <a:ext uri="{28A0092B-C50C-407E-A947-70E740481C1C}">
+                <a14:useLocalDpi xmlns:a14="http://schemas.microsoft.com/office/drawing/2010/main" val="0"/>
+              </a:ext>
+            </a:extLst>
+          </a:blip>
+          <a:srcRect/>
+          <a:stretch>
+            <a:fillRect/>
+          </a:stretch>
+        </p:blipFill>
+        <p:spPr bwMode="auto">
+          <a:xfrm>
+            <a:off x="2933915" y="1815818"/>
+            <a:ext cx="3276171" cy="3226364"/>
+          </a:xfrm>
+          <a:prstGeom prst="rect">
+            <a:avLst/>
+          </a:prstGeom>
+          <a:noFill/>
+          <a:extLst>
+            <a:ext uri="{909E8E84-426E-40DD-AFC4-6F175D3DCCD1}">
+              <a14:hiddenFill xmlns:a14="http://schemas.microsoft.com/office/drawing/2010/main">
+                <a:solidFill>
+                  <a:srgbClr val="FFFFFF"/>
+                </a:solidFill>
+              </a14:hiddenFill>
+            </a:ext>
+          </a:extLst>
+        </p:spPr>
+      </p:pic>
+      <p:cxnSp>
+        <p:nvCxnSpPr>
+          <p:cNvPr id="7" name="Straight Connector 6">
+            <a:extLst>
+              <a:ext uri="{FF2B5EF4-FFF2-40B4-BE49-F238E27FC236}">
+                <a16:creationId xmlns:a16="http://schemas.microsoft.com/office/drawing/2014/main" id="{3CAAFB49-6457-3542-A9A6-A0274DD4E24B}"/>
+              </a:ext>
+            </a:extLst>
+          </p:cNvPr>
+          <p:cNvCxnSpPr/>
+          <p:nvPr/>
+        </p:nvCxnSpPr>
+        <p:spPr>
+          <a:xfrm>
+            <a:off x="6798363" y="6549885"/>
+            <a:ext cx="0" cy="182880"/>
+          </a:xfrm>
+          <a:prstGeom prst="line">
+            <a:avLst/>
+          </a:prstGeom>
+          <a:ln>
+            <a:solidFill>
+              <a:schemeClr val="bg1">
+                <a:lumMod val="85000"/>
+              </a:schemeClr>
+            </a:solidFill>
+          </a:ln>
+        </p:spPr>
+        <p:style>
+          <a:lnRef idx="1">
+            <a:schemeClr val="accent1"/>
+          </a:lnRef>
+          <a:fillRef idx="0">
+            <a:schemeClr val="accent1"/>
+          </a:fillRef>
+          <a:effectRef idx="0">
+            <a:schemeClr val="accent1"/>
+          </a:effectRef>
+          <a:fontRef idx="minor">
+            <a:schemeClr val="tx1"/>
+          </a:fontRef>
+        </p:style>
+      </p:cxnSp>
+      <p:cxnSp>
+        <p:nvCxnSpPr>
+          <p:cNvPr id="8" name="Straight Connector 7">
+            <a:extLst>
+              <a:ext uri="{FF2B5EF4-FFF2-40B4-BE49-F238E27FC236}">
+                <a16:creationId xmlns:a16="http://schemas.microsoft.com/office/drawing/2014/main" id="{E861C8D8-E5BF-B147-9DC8-726AE0008BC3}"/>
+              </a:ext>
+            </a:extLst>
+          </p:cNvPr>
+          <p:cNvCxnSpPr/>
+          <p:nvPr/>
+        </p:nvCxnSpPr>
+        <p:spPr>
+          <a:xfrm>
+            <a:off x="7076661" y="4664763"/>
+            <a:ext cx="182880" cy="0"/>
+          </a:xfrm>
+          <a:prstGeom prst="line">
+            <a:avLst/>
+          </a:prstGeom>
+          <a:ln>
+            <a:solidFill>
+              <a:schemeClr val="bg1">
+                <a:lumMod val="85000"/>
+              </a:schemeClr>
+            </a:solidFill>
+          </a:ln>
+        </p:spPr>
+        <p:style>
+          <a:lnRef idx="1">
+            <a:schemeClr val="accent1"/>
+          </a:lnRef>
+          <a:fillRef idx="0">
+            <a:schemeClr val="accent1"/>
+          </a:fillRef>
+          <a:effectRef idx="0">
+            <a:schemeClr val="accent1"/>
+          </a:effectRef>
+          <a:fontRef idx="minor">
+            <a:schemeClr val="tx1"/>
+          </a:fontRef>
+        </p:style>
+      </p:cxnSp>
+    </p:spTree>
+    <p:extLst>
+      <p:ext uri="{BB962C8B-B14F-4D97-AF65-F5344CB8AC3E}">
+        <p14:creationId xmlns:p14="http://schemas.microsoft.com/office/powerpoint/2010/main" val="568174202"/>
+      </p:ext>
+    </p:extLst>
+  </p:cSld>
+  <p:clrMapOvr>
+    <a:masterClrMapping/>
+  </p:clrMapOvr>
+</p:sld>
+</file>
+
 <file path=ppt/slides/slide22.xml><?xml version="1.0" encoding="utf-8"?>
 <p:sld xmlns:a="http://schemas.openxmlformats.org/drawingml/2006/main" xmlns:r="http://schemas.openxmlformats.org/officeDocument/2006/relationships" xmlns:p="http://schemas.openxmlformats.org/presentationml/2006/main">
   <p:cSld>
@@ -22915,7 +22915,7 @@
           <a:p>
             <a:fld id="{6700A58B-DD98-43D0-B791-721480A02982}" type="datetime1">
               <a:rPr lang="en-US" smtClean="0"/>
-              <a:t>6/9/24</a:t>
+              <a:t>6/14/24</a:t>
             </a:fld>
             <a:endParaRPr lang="en-US"/>
           </a:p>
@@ -23233,7 +23233,7 @@
           <a:p>
             <a:fld id="{6700A58B-DD98-43D0-B791-721480A02982}" type="datetime1">
               <a:rPr lang="en-US" smtClean="0"/>
-              <a:t>6/9/24</a:t>
+              <a:t>6/14/24</a:t>
             </a:fld>
             <a:endParaRPr lang="en-US"/>
           </a:p>
@@ -23489,7 +23489,7 @@
           <a:p>
             <a:fld id="{6700A58B-DD98-43D0-B791-721480A02982}" type="datetime1">
               <a:rPr lang="en-US" smtClean="0"/>
-              <a:t>6/9/24</a:t>
+              <a:t>6/14/24</a:t>
             </a:fld>
             <a:endParaRPr lang="en-US"/>
           </a:p>
@@ -25134,7 +25134,7 @@
           <a:p>
             <a:fld id="{6700A58B-DD98-43D0-B791-721480A02982}" type="datetime1">
               <a:rPr lang="en-US" smtClean="0"/>
-              <a:t>6/9/24</a:t>
+              <a:t>6/14/24</a:t>
             </a:fld>
             <a:endParaRPr lang="en-US"/>
           </a:p>
@@ -25887,7 +25887,7 @@
           <a:p>
             <a:fld id="{6700A58B-DD98-43D0-B791-721480A02982}" type="datetime1">
               <a:rPr lang="en-US" smtClean="0"/>
-              <a:t>6/9/24</a:t>
+              <a:t>6/14/24</a:t>
             </a:fld>
             <a:endParaRPr lang="en-US"/>
           </a:p>
@@ -28011,7 +28011,7 @@
           <a:p>
             <a:fld id="{6700A58B-DD98-43D0-B791-721480A02982}" type="datetime1">
               <a:rPr lang="en-US" smtClean="0"/>
-              <a:t>6/9/24</a:t>
+              <a:t>6/14/24</a:t>
             </a:fld>
             <a:endParaRPr lang="en-US"/>
           </a:p>
@@ -28884,7 +28884,7 @@
           <a:p>
             <a:fld id="{6700A58B-DD98-43D0-B791-721480A02982}" type="datetime1">
               <a:rPr lang="en-US" smtClean="0"/>
-              <a:t>6/9/24</a:t>
+              <a:t>6/14/24</a:t>
             </a:fld>
             <a:endParaRPr lang="en-US"/>
           </a:p>
@@ -29245,7 +29245,7 @@
           <a:p>
             <a:fld id="{6700A58B-DD98-43D0-B791-721480A02982}" type="datetime1">
               <a:rPr lang="en-US" smtClean="0"/>
-              <a:t>6/9/24</a:t>
+              <a:t>6/14/24</a:t>
             </a:fld>
             <a:endParaRPr lang="en-US"/>
           </a:p>
@@ -29698,7 +29698,7 @@
           <a:p>
             <a:fld id="{6700A58B-DD98-43D0-B791-721480A02982}" type="datetime1">
               <a:rPr lang="en-US" smtClean="0"/>
-              <a:t>6/9/24</a:t>
+              <a:t>6/14/24</a:t>
             </a:fld>
             <a:endParaRPr lang="en-US"/>
           </a:p>
@@ -30552,7 +30552,7 @@
           <a:p>
             <a:fld id="{6700A58B-DD98-43D0-B791-721480A02982}" type="datetime1">
               <a:rPr lang="en-US" smtClean="0"/>
-              <a:t>6/9/24</a:t>
+              <a:t>6/14/24</a:t>
             </a:fld>
             <a:endParaRPr lang="en-US"/>
           </a:p>
@@ -31401,7 +31401,7 @@
           <a:p>
             <a:fld id="{6700A58B-DD98-43D0-B791-721480A02982}" type="datetime1">
               <a:rPr lang="en-US" smtClean="0"/>
-              <a:t>6/9/24</a:t>
+              <a:t>6/14/24</a:t>
             </a:fld>
             <a:endParaRPr lang="en-US"/>
           </a:p>
@@ -31762,7 +31762,7 @@
           <a:p>
             <a:fld id="{6700A58B-DD98-43D0-B791-721480A02982}" type="datetime1">
               <a:rPr lang="en-US" smtClean="0"/>
-              <a:t>6/9/24</a:t>
+              <a:t>6/14/24</a:t>
             </a:fld>
             <a:endParaRPr lang="en-US"/>
           </a:p>
@@ -32182,7 +32182,7 @@
           <a:p>
             <a:fld id="{6700A58B-DD98-43D0-B791-721480A02982}" type="datetime1">
               <a:rPr lang="en-US" smtClean="0"/>
-              <a:t>6/9/24</a:t>
+              <a:t>6/14/24</a:t>
             </a:fld>
             <a:endParaRPr lang="en-US"/>
           </a:p>

</xml_diff>